<commit_message>
koren - update design
</commit_message>
<xml_diff>
--- a/Architecture/OSDNA-Object-Model-v3.pptx
+++ b/Architecture/OSDNA-Object-Model-v3.pptx
@@ -243,7 +243,7 @@
           <a:p>
             <a:fld id="{161F3707-6874-402A-91A3-B6073F4C5A8C}" type="datetimeFigureOut">
               <a:rPr lang="en-US" smtClean="0"/>
-              <a:t>3/28/2016</a:t>
+              <a:t>3/29/2016</a:t>
             </a:fld>
             <a:endParaRPr lang="en-US"/>
           </a:p>
@@ -413,7 +413,7 @@
           <a:p>
             <a:fld id="{161F3707-6874-402A-91A3-B6073F4C5A8C}" type="datetimeFigureOut">
               <a:rPr lang="en-US" smtClean="0"/>
-              <a:t>3/28/2016</a:t>
+              <a:t>3/29/2016</a:t>
             </a:fld>
             <a:endParaRPr lang="en-US"/>
           </a:p>
@@ -593,7 +593,7 @@
           <a:p>
             <a:fld id="{161F3707-6874-402A-91A3-B6073F4C5A8C}" type="datetimeFigureOut">
               <a:rPr lang="en-US" smtClean="0"/>
-              <a:t>3/28/2016</a:t>
+              <a:t>3/29/2016</a:t>
             </a:fld>
             <a:endParaRPr lang="en-US"/>
           </a:p>
@@ -763,7 +763,7 @@
           <a:p>
             <a:fld id="{161F3707-6874-402A-91A3-B6073F4C5A8C}" type="datetimeFigureOut">
               <a:rPr lang="en-US" smtClean="0"/>
-              <a:t>3/28/2016</a:t>
+              <a:t>3/29/2016</a:t>
             </a:fld>
             <a:endParaRPr lang="en-US"/>
           </a:p>
@@ -1009,7 +1009,7 @@
           <a:p>
             <a:fld id="{161F3707-6874-402A-91A3-B6073F4C5A8C}" type="datetimeFigureOut">
               <a:rPr lang="en-US" smtClean="0"/>
-              <a:t>3/28/2016</a:t>
+              <a:t>3/29/2016</a:t>
             </a:fld>
             <a:endParaRPr lang="en-US"/>
           </a:p>
@@ -1241,7 +1241,7 @@
           <a:p>
             <a:fld id="{161F3707-6874-402A-91A3-B6073F4C5A8C}" type="datetimeFigureOut">
               <a:rPr lang="en-US" smtClean="0"/>
-              <a:t>3/28/2016</a:t>
+              <a:t>3/29/2016</a:t>
             </a:fld>
             <a:endParaRPr lang="en-US"/>
           </a:p>
@@ -1608,7 +1608,7 @@
           <a:p>
             <a:fld id="{161F3707-6874-402A-91A3-B6073F4C5A8C}" type="datetimeFigureOut">
               <a:rPr lang="en-US" smtClean="0"/>
-              <a:t>3/28/2016</a:t>
+              <a:t>3/29/2016</a:t>
             </a:fld>
             <a:endParaRPr lang="en-US"/>
           </a:p>
@@ -1726,7 +1726,7 @@
           <a:p>
             <a:fld id="{161F3707-6874-402A-91A3-B6073F4C5A8C}" type="datetimeFigureOut">
               <a:rPr lang="en-US" smtClean="0"/>
-              <a:t>3/28/2016</a:t>
+              <a:t>3/29/2016</a:t>
             </a:fld>
             <a:endParaRPr lang="en-US"/>
           </a:p>
@@ -1821,7 +1821,7 @@
           <a:p>
             <a:fld id="{161F3707-6874-402A-91A3-B6073F4C5A8C}" type="datetimeFigureOut">
               <a:rPr lang="en-US" smtClean="0"/>
-              <a:t>3/28/2016</a:t>
+              <a:t>3/29/2016</a:t>
             </a:fld>
             <a:endParaRPr lang="en-US"/>
           </a:p>
@@ -2098,7 +2098,7 @@
           <a:p>
             <a:fld id="{161F3707-6874-402A-91A3-B6073F4C5A8C}" type="datetimeFigureOut">
               <a:rPr lang="en-US" smtClean="0"/>
-              <a:t>3/28/2016</a:t>
+              <a:t>3/29/2016</a:t>
             </a:fld>
             <a:endParaRPr lang="en-US"/>
           </a:p>
@@ -2351,7 +2351,7 @@
           <a:p>
             <a:fld id="{161F3707-6874-402A-91A3-B6073F4C5A8C}" type="datetimeFigureOut">
               <a:rPr lang="en-US" smtClean="0"/>
-              <a:t>3/28/2016</a:t>
+              <a:t>3/29/2016</a:t>
             </a:fld>
             <a:endParaRPr lang="en-US"/>
           </a:p>
@@ -2564,7 +2564,7 @@
           <a:p>
             <a:fld id="{161F3707-6874-402A-91A3-B6073F4C5A8C}" type="datetimeFigureOut">
               <a:rPr lang="en-US" smtClean="0"/>
-              <a:t>3/28/2016</a:t>
+              <a:t>3/29/2016</a:t>
             </a:fld>
             <a:endParaRPr lang="en-US"/>
           </a:p>
@@ -2971,7 +2971,7 @@
       </p:grpSpPr>
       <p:pic>
         <p:nvPicPr>
-          <p:cNvPr id="2" name="Picture 1"/>
+          <p:cNvPr id="3" name="Picture 2"/>
           <p:cNvPicPr>
             <a:picLocks noChangeAspect="1"/>
           </p:cNvPicPr>
@@ -2985,8 +2985,8 @@
         </p:blipFill>
         <p:spPr>
           <a:xfrm>
-            <a:off x="-1" y="0"/>
-            <a:ext cx="9483773" cy="6858000"/>
+            <a:off x="0" y="9524"/>
+            <a:ext cx="9451553" cy="6848475"/>
           </a:xfrm>
           <a:prstGeom prst="rect">
             <a:avLst/>

</xml_diff>